<commit_message>
Revert "Create pkgdown site"
This reverts commit 23f4a54fa3a3eeef10d8fe7351775c7cb3ae7c8f.
</commit_message>
<xml_diff>
--- a/paper/diagram.pptx
+++ b/paper/diagram.pptx
@@ -104,11 +104,6 @@
       </a:defRPr>
     </a:lvl9pPr>
   </p:defaultTextStyle>
-  <p:extLst>
-    <p:ext uri="{EFAFB233-063F-42B5-8137-9DF3F51BA10A}">
-      <p15:sldGuideLst xmlns:p15="http://schemas.microsoft.com/office/powerpoint/2012/main"/>
-    </p:ext>
-  </p:extLst>
 </p:presentation>
 </file>
 
@@ -243,7 +238,7 @@
           <a:p>
             <a:fld id="{E51A548E-C8D5-1E47-9E82-15E99FA68711}" type="datetimeFigureOut">
               <a:rPr lang="en-US" smtClean="0"/>
-              <a:t>9/30/24</a:t>
+              <a:t>9/20/24</a:t>
             </a:fld>
             <a:endParaRPr lang="en-US"/>
           </a:p>
@@ -413,7 +408,7 @@
           <a:p>
             <a:fld id="{E51A548E-C8D5-1E47-9E82-15E99FA68711}" type="datetimeFigureOut">
               <a:rPr lang="en-US" smtClean="0"/>
-              <a:t>9/30/24</a:t>
+              <a:t>9/20/24</a:t>
             </a:fld>
             <a:endParaRPr lang="en-US"/>
           </a:p>
@@ -593,7 +588,7 @@
           <a:p>
             <a:fld id="{E51A548E-C8D5-1E47-9E82-15E99FA68711}" type="datetimeFigureOut">
               <a:rPr lang="en-US" smtClean="0"/>
-              <a:t>9/30/24</a:t>
+              <a:t>9/20/24</a:t>
             </a:fld>
             <a:endParaRPr lang="en-US"/>
           </a:p>
@@ -763,7 +758,7 @@
           <a:p>
             <a:fld id="{E51A548E-C8D5-1E47-9E82-15E99FA68711}" type="datetimeFigureOut">
               <a:rPr lang="en-US" smtClean="0"/>
-              <a:t>9/30/24</a:t>
+              <a:t>9/20/24</a:t>
             </a:fld>
             <a:endParaRPr lang="en-US"/>
           </a:p>
@@ -1009,7 +1004,7 @@
           <a:p>
             <a:fld id="{E51A548E-C8D5-1E47-9E82-15E99FA68711}" type="datetimeFigureOut">
               <a:rPr lang="en-US" smtClean="0"/>
-              <a:t>9/30/24</a:t>
+              <a:t>9/20/24</a:t>
             </a:fld>
             <a:endParaRPr lang="en-US"/>
           </a:p>
@@ -1241,7 +1236,7 @@
           <a:p>
             <a:fld id="{E51A548E-C8D5-1E47-9E82-15E99FA68711}" type="datetimeFigureOut">
               <a:rPr lang="en-US" smtClean="0"/>
-              <a:t>9/30/24</a:t>
+              <a:t>9/20/24</a:t>
             </a:fld>
             <a:endParaRPr lang="en-US"/>
           </a:p>
@@ -1608,7 +1603,7 @@
           <a:p>
             <a:fld id="{E51A548E-C8D5-1E47-9E82-15E99FA68711}" type="datetimeFigureOut">
               <a:rPr lang="en-US" smtClean="0"/>
-              <a:t>9/30/24</a:t>
+              <a:t>9/20/24</a:t>
             </a:fld>
             <a:endParaRPr lang="en-US"/>
           </a:p>
@@ -1726,7 +1721,7 @@
           <a:p>
             <a:fld id="{E51A548E-C8D5-1E47-9E82-15E99FA68711}" type="datetimeFigureOut">
               <a:rPr lang="en-US" smtClean="0"/>
-              <a:t>9/30/24</a:t>
+              <a:t>9/20/24</a:t>
             </a:fld>
             <a:endParaRPr lang="en-US"/>
           </a:p>
@@ -1821,7 +1816,7 @@
           <a:p>
             <a:fld id="{E51A548E-C8D5-1E47-9E82-15E99FA68711}" type="datetimeFigureOut">
               <a:rPr lang="en-US" smtClean="0"/>
-              <a:t>9/30/24</a:t>
+              <a:t>9/20/24</a:t>
             </a:fld>
             <a:endParaRPr lang="en-US"/>
           </a:p>
@@ -2098,7 +2093,7 @@
           <a:p>
             <a:fld id="{E51A548E-C8D5-1E47-9E82-15E99FA68711}" type="datetimeFigureOut">
               <a:rPr lang="en-US" smtClean="0"/>
-              <a:t>9/30/24</a:t>
+              <a:t>9/20/24</a:t>
             </a:fld>
             <a:endParaRPr lang="en-US"/>
           </a:p>
@@ -2355,7 +2350,7 @@
           <a:p>
             <a:fld id="{E51A548E-C8D5-1E47-9E82-15E99FA68711}" type="datetimeFigureOut">
               <a:rPr lang="en-US" smtClean="0"/>
-              <a:t>9/30/24</a:t>
+              <a:t>9/20/24</a:t>
             </a:fld>
             <a:endParaRPr lang="en-US"/>
           </a:p>
@@ -2568,7 +2563,7 @@
           <a:p>
             <a:fld id="{E51A548E-C8D5-1E47-9E82-15E99FA68711}" type="datetimeFigureOut">
               <a:rPr lang="en-US" smtClean="0"/>
-              <a:t>9/30/24</a:t>
+              <a:t>9/20/24</a:t>
             </a:fld>
             <a:endParaRPr lang="en-US"/>
           </a:p>
@@ -3659,7 +3654,7 @@
             <a:pPr algn="ctr"/>
             <a:r>
               <a:rPr lang="en-US" dirty="0"/>
-              <a:t>GISCO data</a:t>
+              <a:t>GSICO data</a:t>
             </a:r>
           </a:p>
         </p:txBody>

</xml_diff>